<commit_message>
User manual of release 0.4
</commit_message>
<xml_diff>
--- a/mansrc/M_PL_012_ziggurat_improved.pptx
+++ b/mansrc/M_PL_012_ziggurat_improved.pptx
@@ -104,6 +104,22 @@
       </a:defRPr>
     </a:lvl9pPr>
   </p:defaultTextStyle>
+  <p:extLst>
+    <p:ext uri="{EFAFB233-063F-42B5-8137-9DF3F51BA10A}">
+      <p15:sldGuideLst xmlns:p15="http://schemas.microsoft.com/office/powerpoint/2012/main">
+        <p15:guide id="1" orient="horz" pos="2880">
+          <p15:clr>
+            <a:srgbClr val="A4A3A4"/>
+          </p15:clr>
+        </p15:guide>
+        <p15:guide id="2" pos="2160">
+          <p15:clr>
+            <a:srgbClr val="A4A3A4"/>
+          </p15:clr>
+        </p15:guide>
+      </p15:sldGuideLst>
+    </p:ext>
+  </p:extLst>
 </p:presentation>
 </file>
 
@@ -288,7 +304,7 @@
           <a:p>
             <a:fld id="{A49FFA58-0CA6-475D-9A7D-BEEDA302D6CC}" type="datetimeFigureOut">
               <a:rPr lang="es-ES" smtClean="0"/>
-              <a:t>20/05/2016</a:t>
+              <a:t>18/05/2017</a:t>
             </a:fld>
             <a:endParaRPr lang="es-ES"/>
           </a:p>
@@ -458,7 +474,7 @@
           <a:p>
             <a:fld id="{A49FFA58-0CA6-475D-9A7D-BEEDA302D6CC}" type="datetimeFigureOut">
               <a:rPr lang="es-ES" smtClean="0"/>
-              <a:t>20/05/2016</a:t>
+              <a:t>18/05/2017</a:t>
             </a:fld>
             <a:endParaRPr lang="es-ES"/>
           </a:p>
@@ -638,7 +654,7 @@
           <a:p>
             <a:fld id="{A49FFA58-0CA6-475D-9A7D-BEEDA302D6CC}" type="datetimeFigureOut">
               <a:rPr lang="es-ES" smtClean="0"/>
-              <a:t>20/05/2016</a:t>
+              <a:t>18/05/2017</a:t>
             </a:fld>
             <a:endParaRPr lang="es-ES"/>
           </a:p>
@@ -808,7 +824,7 @@
           <a:p>
             <a:fld id="{A49FFA58-0CA6-475D-9A7D-BEEDA302D6CC}" type="datetimeFigureOut">
               <a:rPr lang="es-ES" smtClean="0"/>
-              <a:t>20/05/2016</a:t>
+              <a:t>18/05/2017</a:t>
             </a:fld>
             <a:endParaRPr lang="es-ES"/>
           </a:p>
@@ -1054,7 +1070,7 @@
           <a:p>
             <a:fld id="{A49FFA58-0CA6-475D-9A7D-BEEDA302D6CC}" type="datetimeFigureOut">
               <a:rPr lang="es-ES" smtClean="0"/>
-              <a:t>20/05/2016</a:t>
+              <a:t>18/05/2017</a:t>
             </a:fld>
             <a:endParaRPr lang="es-ES"/>
           </a:p>
@@ -1342,7 +1358,7 @@
           <a:p>
             <a:fld id="{A49FFA58-0CA6-475D-9A7D-BEEDA302D6CC}" type="datetimeFigureOut">
               <a:rPr lang="es-ES" smtClean="0"/>
-              <a:t>20/05/2016</a:t>
+              <a:t>18/05/2017</a:t>
             </a:fld>
             <a:endParaRPr lang="es-ES"/>
           </a:p>
@@ -1769,7 +1785,7 @@
           <a:p>
             <a:fld id="{A49FFA58-0CA6-475D-9A7D-BEEDA302D6CC}" type="datetimeFigureOut">
               <a:rPr lang="es-ES" smtClean="0"/>
-              <a:t>20/05/2016</a:t>
+              <a:t>18/05/2017</a:t>
             </a:fld>
             <a:endParaRPr lang="es-ES"/>
           </a:p>
@@ -1887,7 +1903,7 @@
           <a:p>
             <a:fld id="{A49FFA58-0CA6-475D-9A7D-BEEDA302D6CC}" type="datetimeFigureOut">
               <a:rPr lang="es-ES" smtClean="0"/>
-              <a:t>20/05/2016</a:t>
+              <a:t>18/05/2017</a:t>
             </a:fld>
             <a:endParaRPr lang="es-ES"/>
           </a:p>
@@ -1982,7 +1998,7 @@
           <a:p>
             <a:fld id="{A49FFA58-0CA6-475D-9A7D-BEEDA302D6CC}" type="datetimeFigureOut">
               <a:rPr lang="es-ES" smtClean="0"/>
-              <a:t>20/05/2016</a:t>
+              <a:t>18/05/2017</a:t>
             </a:fld>
             <a:endParaRPr lang="es-ES"/>
           </a:p>
@@ -2259,7 +2275,7 @@
           <a:p>
             <a:fld id="{A49FFA58-0CA6-475D-9A7D-BEEDA302D6CC}" type="datetimeFigureOut">
               <a:rPr lang="es-ES" smtClean="0"/>
-              <a:t>20/05/2016</a:t>
+              <a:t>18/05/2017</a:t>
             </a:fld>
             <a:endParaRPr lang="es-ES"/>
           </a:p>
@@ -2512,7 +2528,7 @@
           <a:p>
             <a:fld id="{A49FFA58-0CA6-475D-9A7D-BEEDA302D6CC}" type="datetimeFigureOut">
               <a:rPr lang="es-ES" smtClean="0"/>
-              <a:t>20/05/2016</a:t>
+              <a:t>18/05/2017</a:t>
             </a:fld>
             <a:endParaRPr lang="es-ES"/>
           </a:p>
@@ -2725,7 +2741,7 @@
           <a:p>
             <a:fld id="{A49FFA58-0CA6-475D-9A7D-BEEDA302D6CC}" type="datetimeFigureOut">
               <a:rPr lang="es-ES" smtClean="0"/>
-              <a:t>20/05/2016</a:t>
+              <a:t>18/05/2017</a:t>
             </a:fld>
             <a:endParaRPr lang="es-ES"/>
           </a:p>
@@ -3417,7 +3433,7 @@
                 </a:solidFill>
                 <a:latin typeface="Lucida Sans Typewriter" panose="020B0509030504030204" pitchFamily="49" charset="0"/>
               </a:rPr>
-              <a:t>slategray3, </a:t>
+              <a:t>slategray3”, </a:t>
             </a:r>
             <a:r>
               <a:rPr lang="es-ES" sz="1050" dirty="0" err="1" smtClean="0">
@@ -3934,7 +3950,7 @@
                 </a:solidFill>
                 <a:latin typeface="Lucida Sans Typewriter" panose="020B0509030504030204" pitchFamily="49" charset="0"/>
               </a:rPr>
-              <a:t>horiz_kcoremax_tails_expand</a:t>
+              <a:t>displace_y_a</a:t>
             </a:r>
             <a:r>
               <a:rPr lang="es-ES" sz="1050" dirty="0" smtClean="0">
@@ -3945,18 +3961,7 @@
                 </a:solidFill>
                 <a:latin typeface="Lucida Sans Typewriter" panose="020B0509030504030204" pitchFamily="49" charset="0"/>
               </a:rPr>
-              <a:t> </a:t>
-            </a:r>
-            <a:r>
-              <a:rPr lang="es-ES" sz="1050" dirty="0">
-                <a:solidFill>
-                  <a:schemeClr val="accent3">
-                    <a:lumMod val="50000"/>
-                  </a:schemeClr>
-                </a:solidFill>
-                <a:latin typeface="Lucida Sans Typewriter" panose="020B0509030504030204" pitchFamily="49" charset="0"/>
-              </a:rPr>
-              <a:t>= 3,displace_y_a=c(0,0.5,0,0</a:t>
+              <a:t>=c(0,0.5,0,0</a:t>
             </a:r>
             <a:r>
               <a:rPr lang="es-ES" sz="1050" dirty="0" smtClean="0">
@@ -4453,22 +4458,14 @@
               </a:rPr>
               <a:t>")</a:t>
             </a:r>
-            <a:endParaRPr lang="es-ES" sz="1050" dirty="0">
-              <a:solidFill>
-                <a:schemeClr val="accent3">
-                  <a:lumMod val="50000"/>
-                </a:schemeClr>
-              </a:solidFill>
-              <a:latin typeface="Lucida Sans Typewriter" panose="020B0509030504030204" pitchFamily="49" charset="0"/>
-            </a:endParaRPr>
           </a:p>
         </p:txBody>
       </p:sp>
       <p:pic>
         <p:nvPicPr>
-          <p:cNvPr id="1026" name="Picture 2" descr="D:\disco_usuario\javier\upm\doctorado\tesis\codigo\k-analysis\grafresults\M_PL_012_ziggurat_improved.png"/>
+          <p:cNvPr id="3" name="Imagen 2"/>
           <p:cNvPicPr>
-            <a:picLocks noChangeAspect="1" noChangeArrowheads="1"/>
+            <a:picLocks noChangeAspect="1"/>
           </p:cNvPicPr>
           <p:nvPr/>
         </p:nvPicPr>
@@ -4480,29 +4477,18 @@
               </a:ext>
             </a:extLst>
           </a:blip>
-          <a:srcRect/>
           <a:stretch>
             <a:fillRect/>
           </a:stretch>
         </p:blipFill>
-        <p:spPr bwMode="auto">
+        <p:spPr>
           <a:xfrm>
-            <a:off x="92895" y="3540095"/>
-            <a:ext cx="6720481" cy="5280377"/>
+            <a:off x="-23837" y="3755572"/>
+            <a:ext cx="6858000" cy="5388428"/>
           </a:xfrm>
           <a:prstGeom prst="rect">
             <a:avLst/>
           </a:prstGeom>
-          <a:noFill/>
-          <a:extLst>
-            <a:ext uri="{909E8E84-426E-40DD-AFC4-6F175D3DCCD1}">
-              <a14:hiddenFill xmlns:a14="http://schemas.microsoft.com/office/drawing/2010/main">
-                <a:solidFill>
-                  <a:srgbClr val="FFFFFF"/>
-                </a:solidFill>
-              </a14:hiddenFill>
-            </a:ext>
-          </a:extLst>
         </p:spPr>
       </p:pic>
     </p:spTree>

</xml_diff>

<commit_message>
User manual update to include instructions about Rtools
</commit_message>
<xml_diff>
--- a/mansrc/M_PL_012_ziggurat_improved.pptx
+++ b/mansrc/M_PL_012_ziggurat_improved.pptx
@@ -104,6 +104,22 @@
       </a:defRPr>
     </a:lvl9pPr>
   </p:defaultTextStyle>
+  <p:extLst>
+    <p:ext uri="{EFAFB233-063F-42B5-8137-9DF3F51BA10A}">
+      <p15:sldGuideLst xmlns:p15="http://schemas.microsoft.com/office/powerpoint/2012/main">
+        <p15:guide id="1" orient="horz" pos="2880">
+          <p15:clr>
+            <a:srgbClr val="A4A3A4"/>
+          </p15:clr>
+        </p15:guide>
+        <p15:guide id="2" pos="2160">
+          <p15:clr>
+            <a:srgbClr val="A4A3A4"/>
+          </p15:clr>
+        </p15:guide>
+      </p15:sldGuideLst>
+    </p:ext>
+  </p:extLst>
 </p:presentation>
 </file>
 
@@ -288,7 +304,7 @@
           <a:p>
             <a:fld id="{A49FFA58-0CA6-475D-9A7D-BEEDA302D6CC}" type="datetimeFigureOut">
               <a:rPr lang="es-ES" smtClean="0"/>
-              <a:t>20/05/2016</a:t>
+              <a:t>18/05/2017</a:t>
             </a:fld>
             <a:endParaRPr lang="es-ES"/>
           </a:p>
@@ -458,7 +474,7 @@
           <a:p>
             <a:fld id="{A49FFA58-0CA6-475D-9A7D-BEEDA302D6CC}" type="datetimeFigureOut">
               <a:rPr lang="es-ES" smtClean="0"/>
-              <a:t>20/05/2016</a:t>
+              <a:t>18/05/2017</a:t>
             </a:fld>
             <a:endParaRPr lang="es-ES"/>
           </a:p>
@@ -638,7 +654,7 @@
           <a:p>
             <a:fld id="{A49FFA58-0CA6-475D-9A7D-BEEDA302D6CC}" type="datetimeFigureOut">
               <a:rPr lang="es-ES" smtClean="0"/>
-              <a:t>20/05/2016</a:t>
+              <a:t>18/05/2017</a:t>
             </a:fld>
             <a:endParaRPr lang="es-ES"/>
           </a:p>
@@ -808,7 +824,7 @@
           <a:p>
             <a:fld id="{A49FFA58-0CA6-475D-9A7D-BEEDA302D6CC}" type="datetimeFigureOut">
               <a:rPr lang="es-ES" smtClean="0"/>
-              <a:t>20/05/2016</a:t>
+              <a:t>18/05/2017</a:t>
             </a:fld>
             <a:endParaRPr lang="es-ES"/>
           </a:p>
@@ -1054,7 +1070,7 @@
           <a:p>
             <a:fld id="{A49FFA58-0CA6-475D-9A7D-BEEDA302D6CC}" type="datetimeFigureOut">
               <a:rPr lang="es-ES" smtClean="0"/>
-              <a:t>20/05/2016</a:t>
+              <a:t>18/05/2017</a:t>
             </a:fld>
             <a:endParaRPr lang="es-ES"/>
           </a:p>
@@ -1342,7 +1358,7 @@
           <a:p>
             <a:fld id="{A49FFA58-0CA6-475D-9A7D-BEEDA302D6CC}" type="datetimeFigureOut">
               <a:rPr lang="es-ES" smtClean="0"/>
-              <a:t>20/05/2016</a:t>
+              <a:t>18/05/2017</a:t>
             </a:fld>
             <a:endParaRPr lang="es-ES"/>
           </a:p>
@@ -1769,7 +1785,7 @@
           <a:p>
             <a:fld id="{A49FFA58-0CA6-475D-9A7D-BEEDA302D6CC}" type="datetimeFigureOut">
               <a:rPr lang="es-ES" smtClean="0"/>
-              <a:t>20/05/2016</a:t>
+              <a:t>18/05/2017</a:t>
             </a:fld>
             <a:endParaRPr lang="es-ES"/>
           </a:p>
@@ -1887,7 +1903,7 @@
           <a:p>
             <a:fld id="{A49FFA58-0CA6-475D-9A7D-BEEDA302D6CC}" type="datetimeFigureOut">
               <a:rPr lang="es-ES" smtClean="0"/>
-              <a:t>20/05/2016</a:t>
+              <a:t>18/05/2017</a:t>
             </a:fld>
             <a:endParaRPr lang="es-ES"/>
           </a:p>
@@ -1982,7 +1998,7 @@
           <a:p>
             <a:fld id="{A49FFA58-0CA6-475D-9A7D-BEEDA302D6CC}" type="datetimeFigureOut">
               <a:rPr lang="es-ES" smtClean="0"/>
-              <a:t>20/05/2016</a:t>
+              <a:t>18/05/2017</a:t>
             </a:fld>
             <a:endParaRPr lang="es-ES"/>
           </a:p>
@@ -2259,7 +2275,7 @@
           <a:p>
             <a:fld id="{A49FFA58-0CA6-475D-9A7D-BEEDA302D6CC}" type="datetimeFigureOut">
               <a:rPr lang="es-ES" smtClean="0"/>
-              <a:t>20/05/2016</a:t>
+              <a:t>18/05/2017</a:t>
             </a:fld>
             <a:endParaRPr lang="es-ES"/>
           </a:p>
@@ -2512,7 +2528,7 @@
           <a:p>
             <a:fld id="{A49FFA58-0CA6-475D-9A7D-BEEDA302D6CC}" type="datetimeFigureOut">
               <a:rPr lang="es-ES" smtClean="0"/>
-              <a:t>20/05/2016</a:t>
+              <a:t>18/05/2017</a:t>
             </a:fld>
             <a:endParaRPr lang="es-ES"/>
           </a:p>
@@ -2725,7 +2741,7 @@
           <a:p>
             <a:fld id="{A49FFA58-0CA6-475D-9A7D-BEEDA302D6CC}" type="datetimeFigureOut">
               <a:rPr lang="es-ES" smtClean="0"/>
-              <a:t>20/05/2016</a:t>
+              <a:t>18/05/2017</a:t>
             </a:fld>
             <a:endParaRPr lang="es-ES"/>
           </a:p>
@@ -3417,7 +3433,7 @@
                 </a:solidFill>
                 <a:latin typeface="Lucida Sans Typewriter" panose="020B0509030504030204" pitchFamily="49" charset="0"/>
               </a:rPr>
-              <a:t>slategray3, </a:t>
+              <a:t>slategray3”, </a:t>
             </a:r>
             <a:r>
               <a:rPr lang="es-ES" sz="1050" dirty="0" err="1" smtClean="0">
@@ -3934,7 +3950,7 @@
                 </a:solidFill>
                 <a:latin typeface="Lucida Sans Typewriter" panose="020B0509030504030204" pitchFamily="49" charset="0"/>
               </a:rPr>
-              <a:t>horiz_kcoremax_tails_expand</a:t>
+              <a:t>displace_y_a</a:t>
             </a:r>
             <a:r>
               <a:rPr lang="es-ES" sz="1050" dirty="0" smtClean="0">
@@ -3945,18 +3961,7 @@
                 </a:solidFill>
                 <a:latin typeface="Lucida Sans Typewriter" panose="020B0509030504030204" pitchFamily="49" charset="0"/>
               </a:rPr>
-              <a:t> </a:t>
-            </a:r>
-            <a:r>
-              <a:rPr lang="es-ES" sz="1050" dirty="0">
-                <a:solidFill>
-                  <a:schemeClr val="accent3">
-                    <a:lumMod val="50000"/>
-                  </a:schemeClr>
-                </a:solidFill>
-                <a:latin typeface="Lucida Sans Typewriter" panose="020B0509030504030204" pitchFamily="49" charset="0"/>
-              </a:rPr>
-              <a:t>= 3,displace_y_a=c(0,0.5,0,0</a:t>
+              <a:t>=c(0,0.5,0,0</a:t>
             </a:r>
             <a:r>
               <a:rPr lang="es-ES" sz="1050" dirty="0" smtClean="0">
@@ -4453,22 +4458,14 @@
               </a:rPr>
               <a:t>")</a:t>
             </a:r>
-            <a:endParaRPr lang="es-ES" sz="1050" dirty="0">
-              <a:solidFill>
-                <a:schemeClr val="accent3">
-                  <a:lumMod val="50000"/>
-                </a:schemeClr>
-              </a:solidFill>
-              <a:latin typeface="Lucida Sans Typewriter" panose="020B0509030504030204" pitchFamily="49" charset="0"/>
-            </a:endParaRPr>
           </a:p>
         </p:txBody>
       </p:sp>
       <p:pic>
         <p:nvPicPr>
-          <p:cNvPr id="1026" name="Picture 2" descr="D:\disco_usuario\javier\upm\doctorado\tesis\codigo\k-analysis\grafresults\M_PL_012_ziggurat_improved.png"/>
+          <p:cNvPr id="3" name="Imagen 2"/>
           <p:cNvPicPr>
-            <a:picLocks noChangeAspect="1" noChangeArrowheads="1"/>
+            <a:picLocks noChangeAspect="1"/>
           </p:cNvPicPr>
           <p:nvPr/>
         </p:nvPicPr>
@@ -4480,29 +4477,18 @@
               </a:ext>
             </a:extLst>
           </a:blip>
-          <a:srcRect/>
           <a:stretch>
             <a:fillRect/>
           </a:stretch>
         </p:blipFill>
-        <p:spPr bwMode="auto">
+        <p:spPr>
           <a:xfrm>
-            <a:off x="92895" y="3540095"/>
-            <a:ext cx="6720481" cy="5280377"/>
+            <a:off x="-23837" y="3755572"/>
+            <a:ext cx="6858000" cy="5388428"/>
           </a:xfrm>
           <a:prstGeom prst="rect">
             <a:avLst/>
           </a:prstGeom>
-          <a:noFill/>
-          <a:extLst>
-            <a:ext uri="{909E8E84-426E-40DD-AFC4-6F175D3DCCD1}">
-              <a14:hiddenFill xmlns:a14="http://schemas.microsoft.com/office/drawing/2010/main">
-                <a:solidFill>
-                  <a:srgbClr val="FFFFFF"/>
-                </a:solidFill>
-              </a14:hiddenFill>
-            </a:ext>
-          </a:extLst>
         </p:spPr>
       </p:pic>
     </p:spTree>

</xml_diff>